<commit_message>
Neutrons v1.6.6. Figures for article 'TmVO4_model_nematicity'. Modified 2D color plot of (8 8 0) peak intensity vs H at 0.6K.
</commit_message>
<xml_diff>
--- a/Matlab_debugging.pptx
+++ b/Matlab_debugging.pptx
@@ -5,11 +5,12 @@
     <p:sldMasterId id="2147483648" r:id="rId1"/>
   </p:sldMasterIdLst>
   <p:notesMasterIdLst>
-    <p:notesMasterId r:id="rId4"/>
+    <p:notesMasterId r:id="rId5"/>
   </p:notesMasterIdLst>
   <p:sldIdLst>
     <p:sldId id="256" r:id="rId2"/>
     <p:sldId id="257" r:id="rId3"/>
+    <p:sldId id="258" r:id="rId4"/>
   </p:sldIdLst>
   <p:sldSz cx="9144000" cy="6858000" type="screen4x3"/>
   <p:notesSz cx="6858000" cy="9144000"/>
@@ -266,7 +267,7 @@
               <a:pPr>
                 <a:defRPr/>
               </a:pPr>
-              <a:t>3/7/2018</a:t>
+              <a:t>2019-04-30</a:t>
             </a:fld>
             <a:endParaRPr lang="en-US"/>
           </a:p>
@@ -969,7 +970,7 @@
             </a:pPr>
             <a:fld id="{5CB3DCE4-6537-4D93-A337-FE2186712698}" type="datetime1">
               <a:rPr lang="en-US" smtClean="0"/>
-              <a:t>3/7/2018</a:t>
+              <a:t>2019-04-30</a:t>
             </a:fld>
             <a:endParaRPr lang="en-US"/>
           </a:p>
@@ -1253,7 +1254,7 @@
             </a:pPr>
             <a:fld id="{604C1E17-5DD7-4FC2-98E9-41DA86B0671A}" type="datetime1">
               <a:rPr lang="en-US" smtClean="0"/>
-              <a:t>3/7/2018</a:t>
+              <a:t>2019-04-30</a:t>
             </a:fld>
             <a:endParaRPr lang="en-US"/>
           </a:p>
@@ -1453,7 +1454,7 @@
             </a:pPr>
             <a:fld id="{0E2CB7EE-0055-42FE-B996-0295368CF26D}" type="datetime1">
               <a:rPr lang="en-US" smtClean="0"/>
-              <a:t>3/7/2018</a:t>
+              <a:t>2019-04-30</a:t>
             </a:fld>
             <a:endParaRPr lang="en-US"/>
           </a:p>
@@ -1875,7 +1876,7 @@
             </a:pPr>
             <a:fld id="{9EE6917F-DFFE-4765-A49F-C296D20ED564}" type="datetime1">
               <a:rPr lang="en-US" smtClean="0"/>
-              <a:t>3/7/2018</a:t>
+              <a:t>2019-04-30</a:t>
             </a:fld>
             <a:endParaRPr lang="en-US"/>
           </a:p>
@@ -2237,7 +2238,7 @@
             </a:pPr>
             <a:fld id="{8ED8F8ED-FC85-40C5-9279-328500180C47}" type="datetime1">
               <a:rPr lang="en-US" smtClean="0"/>
-              <a:t>3/7/2018</a:t>
+              <a:t>2019-04-30</a:t>
             </a:fld>
             <a:endParaRPr lang="en-US"/>
           </a:p>
@@ -2774,7 +2775,7 @@
             </a:pPr>
             <a:fld id="{7D11AB2C-8423-42B4-B784-56289833691A}" type="datetime1">
               <a:rPr lang="en-US" smtClean="0"/>
-              <a:t>3/7/2018</a:t>
+              <a:t>2019-04-30</a:t>
             </a:fld>
             <a:endParaRPr lang="en-US"/>
           </a:p>
@@ -3535,7 +3536,7 @@
             </a:pPr>
             <a:fld id="{074FE212-E83D-4810-AA18-C7E05F9C347D}" type="datetime1">
               <a:rPr lang="en-US" smtClean="0"/>
-              <a:t>3/7/2018</a:t>
+              <a:t>2019-04-30</a:t>
             </a:fld>
             <a:endParaRPr lang="en-US"/>
           </a:p>
@@ -4046,7 +4047,7 @@
             </a:pPr>
             <a:fld id="{9B4E3952-4978-49C6-94B4-030D75E24781}" type="datetime1">
               <a:rPr lang="en-US" smtClean="0"/>
-              <a:t>3/7/2018</a:t>
+              <a:t>2019-04-30</a:t>
             </a:fld>
             <a:endParaRPr lang="en-US"/>
           </a:p>
@@ -4376,7 +4377,7 @@
             </a:pPr>
             <a:fld id="{F9659B9D-B560-46A8-B85C-9DF0C77084F2}" type="datetime1">
               <a:rPr lang="en-US" smtClean="0"/>
-              <a:t>3/7/2018</a:t>
+              <a:t>2019-04-30</a:t>
             </a:fld>
             <a:endParaRPr lang="en-US"/>
           </a:p>
@@ -4691,7 +4692,7 @@
             </a:pPr>
             <a:fld id="{AB056DD9-73B1-45C9-A264-BA0A39D0365F}" type="datetime1">
               <a:rPr lang="en-US" smtClean="0"/>
-              <a:t>3/7/2018</a:t>
+              <a:t>2019-04-30</a:t>
             </a:fld>
             <a:endParaRPr lang="en-US"/>
           </a:p>
@@ -4971,7 +4972,7 @@
             </a:pPr>
             <a:fld id="{0C9256D4-C177-43B1-8ED3-4D1621DA3A48}" type="datetime1">
               <a:rPr lang="en-US" smtClean="0"/>
-              <a:t>3/7/2018</a:t>
+              <a:t>2019-04-30</a:t>
             </a:fld>
             <a:endParaRPr lang="en-US"/>
           </a:p>
@@ -5147,35 +5148,35 @@
           <a:p>
             <a:pPr lvl="0"/>
             <a:r>
-              <a:rPr lang="en-US"/>
+              <a:rPr lang="en-US" dirty="0"/>
               <a:t>Edit Master text styles</a:t>
             </a:r>
           </a:p>
           <a:p>
             <a:pPr lvl="1"/>
             <a:r>
-              <a:rPr lang="en-US"/>
+              <a:rPr lang="en-US" dirty="0"/>
               <a:t>Second level</a:t>
             </a:r>
           </a:p>
           <a:p>
             <a:pPr lvl="2"/>
             <a:r>
-              <a:rPr lang="en-US"/>
+              <a:rPr lang="en-US" dirty="0"/>
               <a:t>Third level</a:t>
             </a:r>
           </a:p>
           <a:p>
             <a:pPr lvl="3"/>
             <a:r>
-              <a:rPr lang="en-US"/>
+              <a:rPr lang="en-US" dirty="0"/>
               <a:t>Fourth level</a:t>
             </a:r>
           </a:p>
           <a:p>
             <a:pPr lvl="4"/>
             <a:r>
-              <a:rPr lang="en-US"/>
+              <a:rPr lang="en-US" dirty="0"/>
               <a:t>Fifth level</a:t>
             </a:r>
           </a:p>
@@ -5227,7 +5228,7 @@
             </a:pPr>
             <a:fld id="{E557988D-A701-4F6C-8A61-D2712D9FEA58}" type="datetime1">
               <a:rPr lang="en-US" smtClean="0"/>
-              <a:t>3/7/2018</a:t>
+              <a:t>2019-04-30</a:t>
             </a:fld>
             <a:endParaRPr lang="en-US"/>
           </a:p>
@@ -5497,7 +5498,7 @@
         </a:spcAft>
         <a:buFont typeface="Arial" charset="0"/>
         <a:buChar char="•"/>
-        <a:defRPr sz="3200" kern="1200">
+        <a:defRPr sz="2400" kern="1200">
           <a:solidFill>
             <a:schemeClr val="tx1"/>
           </a:solidFill>
@@ -5515,7 +5516,7 @@
         </a:spcAft>
         <a:buFont typeface="Arial" charset="0"/>
         <a:buChar char="–"/>
-        <a:defRPr sz="2800" kern="1200">
+        <a:defRPr sz="2000" kern="1200">
           <a:solidFill>
             <a:schemeClr val="tx1"/>
           </a:solidFill>
@@ -5533,7 +5534,7 @@
         </a:spcAft>
         <a:buFont typeface="Arial" charset="0"/>
         <a:buChar char="•"/>
-        <a:defRPr sz="2400" kern="1200">
+        <a:defRPr sz="1800" kern="1200">
           <a:solidFill>
             <a:schemeClr val="tx1"/>
           </a:solidFill>
@@ -5551,7 +5552,7 @@
         </a:spcAft>
         <a:buFont typeface="Arial" charset="0"/>
         <a:buChar char="–"/>
-        <a:defRPr sz="2000" kern="1200">
+        <a:defRPr sz="1600" kern="1200">
           <a:solidFill>
             <a:schemeClr val="tx1"/>
           </a:solidFill>
@@ -5569,7 +5570,7 @@
         </a:spcAft>
         <a:buFont typeface="Arial" charset="0"/>
         <a:buChar char="»"/>
-        <a:defRPr sz="2000" kern="1200">
+        <a:defRPr sz="1600" kern="1200">
           <a:solidFill>
             <a:schemeClr val="tx1"/>
           </a:solidFill>
@@ -5863,7 +5864,7 @@
             </a:pPr>
             <a:fld id="{1C07F3DF-81A2-44E4-AB78-AC3384F859C5}" type="datetime1">
               <a:rPr lang="en-US" smtClean="0"/>
-              <a:t>3/7/2018</a:t>
+              <a:t>2019-04-30</a:t>
             </a:fld>
             <a:endParaRPr lang="en-US"/>
           </a:p>
@@ -6110,7 +6111,7 @@
             </a:pPr>
             <a:fld id="{9EE6917F-DFFE-4765-A49F-C296D20ED564}" type="datetime1">
               <a:rPr lang="en-US" smtClean="0"/>
-              <a:t>3/7/2018</a:t>
+              <a:t>2019-04-30</a:t>
             </a:fld>
             <a:endParaRPr lang="en-US"/>
           </a:p>
@@ -6212,6 +6213,295 @@
     <p:extLst>
       <p:ext uri="{BB962C8B-B14F-4D97-AF65-F5344CB8AC3E}">
         <p14:creationId xmlns:p14="http://schemas.microsoft.com/office/powerpoint/2010/main" val="3513071939"/>
+      </p:ext>
+    </p:extLst>
+  </p:cSld>
+  <p:clrMapOvr>
+    <a:masterClrMapping/>
+  </p:clrMapOvr>
+</p:sld>
+</file>
+
+<file path=ppt/slides/slide3.xml><?xml version="1.0" encoding="utf-8"?>
+<p:sld xmlns:a="http://schemas.openxmlformats.org/drawingml/2006/main" xmlns:r="http://schemas.openxmlformats.org/officeDocument/2006/relationships" xmlns:p="http://schemas.openxmlformats.org/presentationml/2006/main">
+  <p:cSld>
+    <p:spTree>
+      <p:nvGrpSpPr>
+        <p:cNvPr id="1" name=""/>
+        <p:cNvGrpSpPr/>
+        <p:nvPr/>
+      </p:nvGrpSpPr>
+      <p:grpSpPr>
+        <a:xfrm>
+          <a:off x="0" y="0"/>
+          <a:ext cx="0" cy="0"/>
+          <a:chOff x="0" y="0"/>
+          <a:chExt cx="0" cy="0"/>
+        </a:xfrm>
+      </p:grpSpPr>
+      <p:sp>
+        <p:nvSpPr>
+          <p:cNvPr id="2" name="Content Placeholder 1">
+            <a:extLst>
+              <a:ext uri="{FF2B5EF4-FFF2-40B4-BE49-F238E27FC236}">
+                <a16:creationId xmlns:a16="http://schemas.microsoft.com/office/drawing/2014/main" id="{0A67E884-6EA8-48FE-89AB-17AB84397FC8}"/>
+              </a:ext>
+            </a:extLst>
+          </p:cNvPr>
+          <p:cNvSpPr>
+            <a:spLocks noGrp="1"/>
+          </p:cNvSpPr>
+          <p:nvPr>
+            <p:ph idx="1"/>
+          </p:nvPr>
+        </p:nvSpPr>
+        <p:spPr/>
+        <p:txBody>
+          <a:bodyPr/>
+          <a:lstStyle/>
+          <a:p>
+            <a:r>
+              <a:rPr lang="en-US" dirty="0" err="1"/>
+              <a:t>Matlab</a:t>
+            </a:r>
+            <a:r>
+              <a:rPr lang="en-US" dirty="0"/>
+              <a:t> does not seem to have any plotting tool that allows to do a 2D color plot using a </a:t>
+            </a:r>
+            <a:r>
+              <a:rPr lang="en-US" dirty="0" err="1"/>
+              <a:t>meshgrid</a:t>
+            </a:r>
+            <a:endParaRPr lang="en-US" dirty="0"/>
+          </a:p>
+          <a:p>
+            <a:pPr lvl="1"/>
+            <a:r>
+              <a:rPr lang="en-US" dirty="0"/>
+              <a:t>surf allows to plot a 3D surface with a color gradient, but if the intensity (Z data) is positive, any 1D scatter will be under the surface, therefore invisible when showing a 2D view</a:t>
+            </a:r>
+          </a:p>
+          <a:p>
+            <a:pPr lvl="1"/>
+            <a:r>
+              <a:rPr lang="en-US" dirty="0" err="1"/>
+              <a:t>imagesc</a:t>
+            </a:r>
+            <a:r>
+              <a:rPr lang="en-US" dirty="0"/>
+              <a:t> does not take x and y data as input, only boundaries, and uses row and column numbers (i.e. pixels) as x and y data</a:t>
+            </a:r>
+          </a:p>
+          <a:p>
+            <a:r>
+              <a:rPr lang="en-US" dirty="0"/>
+              <a:t>Solution: if Z data is positive, plot –Z and plot 1D data on top</a:t>
+            </a:r>
+          </a:p>
+          <a:p>
+            <a:pPr lvl="1"/>
+            <a:r>
+              <a:rPr lang="en-US" dirty="0"/>
+              <a:t>works if no </a:t>
+            </a:r>
+            <a:r>
+              <a:rPr lang="en-US" dirty="0" err="1"/>
+              <a:t>colorbar</a:t>
+            </a:r>
+            <a:r>
+              <a:rPr lang="en-US" dirty="0"/>
+              <a:t> needed; otherwise, must play around with </a:t>
+            </a:r>
+            <a:r>
+              <a:rPr lang="en-US" dirty="0" err="1"/>
+              <a:t>colorbar</a:t>
+            </a:r>
+            <a:r>
+              <a:rPr lang="en-US" dirty="0"/>
+              <a:t>: show it as reverse, inverse colormap, modify tick labels</a:t>
+            </a:r>
+          </a:p>
+          <a:p>
+            <a:pPr lvl="1"/>
+            <a:r>
+              <a:rPr lang="en-US" dirty="0"/>
+              <a:t>see </a:t>
+            </a:r>
+            <a:r>
+              <a:rPr lang="en-US"/>
+              <a:t>end of file </a:t>
+            </a:r>
+            <a:r>
+              <a:rPr lang="en-US" dirty="0"/>
+              <a:t>‘</a:t>
+            </a:r>
+            <a:r>
+              <a:rPr lang="en-US" dirty="0" err="1"/>
+              <a:t>ENS_peak_fit_ICpV.m</a:t>
+            </a:r>
+            <a:r>
+              <a:rPr lang="en-US" dirty="0"/>
+              <a:t>’</a:t>
+            </a:r>
+          </a:p>
+        </p:txBody>
+      </p:sp>
+      <p:sp>
+        <p:nvSpPr>
+          <p:cNvPr id="3" name="Title 2">
+            <a:extLst>
+              <a:ext uri="{FF2B5EF4-FFF2-40B4-BE49-F238E27FC236}">
+                <a16:creationId xmlns:a16="http://schemas.microsoft.com/office/drawing/2014/main" id="{AA9B5876-3AD6-4E03-BEC3-4B9C615A457C}"/>
+              </a:ext>
+            </a:extLst>
+          </p:cNvPr>
+          <p:cNvSpPr>
+            <a:spLocks noGrp="1"/>
+          </p:cNvSpPr>
+          <p:nvPr>
+            <p:ph type="title"/>
+          </p:nvPr>
+        </p:nvSpPr>
+        <p:spPr/>
+        <p:txBody>
+          <a:bodyPr/>
+          <a:lstStyle/>
+          <a:p>
+            <a:r>
+              <a:rPr lang="en-US" dirty="0"/>
+              <a:t>1D scatter on top of 2D color plot</a:t>
+            </a:r>
+          </a:p>
+        </p:txBody>
+      </p:sp>
+      <p:sp>
+        <p:nvSpPr>
+          <p:cNvPr id="4" name="Date Placeholder 3">
+            <a:extLst>
+              <a:ext uri="{FF2B5EF4-FFF2-40B4-BE49-F238E27FC236}">
+                <a16:creationId xmlns:a16="http://schemas.microsoft.com/office/drawing/2014/main" id="{D4C074C6-AFF4-472A-A6B0-6856665BA17F}"/>
+              </a:ext>
+            </a:extLst>
+          </p:cNvPr>
+          <p:cNvSpPr>
+            <a:spLocks noGrp="1"/>
+          </p:cNvSpPr>
+          <p:nvPr>
+            <p:ph type="dt" sz="half" idx="10"/>
+          </p:nvPr>
+        </p:nvSpPr>
+        <p:spPr/>
+        <p:txBody>
+          <a:bodyPr/>
+          <a:lstStyle/>
+          <a:p>
+            <a:pPr>
+              <a:defRPr/>
+            </a:pPr>
+            <a:fld id="{9EE6917F-DFFE-4765-A49F-C296D20ED564}" type="datetime1">
+              <a:rPr lang="en-US" smtClean="0"/>
+              <a:t>2019-04-30</a:t>
+            </a:fld>
+            <a:endParaRPr lang="en-US"/>
+          </a:p>
+        </p:txBody>
+      </p:sp>
+      <p:sp>
+        <p:nvSpPr>
+          <p:cNvPr id="5" name="Footer Placeholder 4">
+            <a:extLst>
+              <a:ext uri="{FF2B5EF4-FFF2-40B4-BE49-F238E27FC236}">
+                <a16:creationId xmlns:a16="http://schemas.microsoft.com/office/drawing/2014/main" id="{E9B50075-87B7-4717-A8F7-CED751359EE4}"/>
+              </a:ext>
+            </a:extLst>
+          </p:cNvPr>
+          <p:cNvSpPr>
+            <a:spLocks noGrp="1"/>
+          </p:cNvSpPr>
+          <p:nvPr>
+            <p:ph type="ftr" sz="quarter" idx="11"/>
+          </p:nvPr>
+        </p:nvSpPr>
+        <p:spPr/>
+        <p:txBody>
+          <a:bodyPr/>
+          <a:lstStyle/>
+          <a:p>
+            <a:pPr>
+              <a:defRPr/>
+            </a:pPr>
+            <a:r>
+              <a:rPr lang="en-US"/>
+              <a:t>A sample title</a:t>
+            </a:r>
+            <a:endParaRPr lang="en-US" dirty="0"/>
+          </a:p>
+        </p:txBody>
+      </p:sp>
+      <p:sp>
+        <p:nvSpPr>
+          <p:cNvPr id="6" name="Slide Number Placeholder 5">
+            <a:extLst>
+              <a:ext uri="{FF2B5EF4-FFF2-40B4-BE49-F238E27FC236}">
+                <a16:creationId xmlns:a16="http://schemas.microsoft.com/office/drawing/2014/main" id="{F1C9D5DD-1768-45AA-BC04-DD938A2F9006}"/>
+              </a:ext>
+            </a:extLst>
+          </p:cNvPr>
+          <p:cNvSpPr>
+            <a:spLocks noGrp="1"/>
+          </p:cNvSpPr>
+          <p:nvPr>
+            <p:ph type="sldNum" sz="quarter" idx="12"/>
+          </p:nvPr>
+        </p:nvSpPr>
+        <p:spPr/>
+        <p:txBody>
+          <a:bodyPr/>
+          <a:lstStyle/>
+          <a:p>
+            <a:pPr>
+              <a:defRPr/>
+            </a:pPr>
+            <a:fld id="{5BC7FEBF-A170-470C-A369-F0D066FB58E5}" type="slidenum">
+              <a:rPr lang="en-US" smtClean="0"/>
+              <a:pPr>
+                <a:defRPr/>
+              </a:pPr>
+              <a:t>3</a:t>
+            </a:fld>
+            <a:endParaRPr lang="en-US"/>
+          </a:p>
+        </p:txBody>
+      </p:sp>
+      <p:sp>
+        <p:nvSpPr>
+          <p:cNvPr id="7" name="Text Placeholder 6">
+            <a:extLst>
+              <a:ext uri="{FF2B5EF4-FFF2-40B4-BE49-F238E27FC236}">
+                <a16:creationId xmlns:a16="http://schemas.microsoft.com/office/drawing/2014/main" id="{DBBEE4EA-15F2-4CA2-82B1-B3B7A85A0D20}"/>
+              </a:ext>
+            </a:extLst>
+          </p:cNvPr>
+          <p:cNvSpPr>
+            <a:spLocks noGrp="1"/>
+          </p:cNvSpPr>
+          <p:nvPr>
+            <p:ph type="body" sz="quarter" idx="13"/>
+          </p:nvPr>
+        </p:nvSpPr>
+        <p:spPr/>
+        <p:txBody>
+          <a:bodyPr/>
+          <a:lstStyle/>
+          <a:p>
+            <a:endParaRPr lang="en-US"/>
+          </a:p>
+        </p:txBody>
+      </p:sp>
+    </p:spTree>
+    <p:extLst>
+      <p:ext uri="{BB962C8B-B14F-4D97-AF65-F5344CB8AC3E}">
+        <p14:creationId xmlns:p14="http://schemas.microsoft.com/office/powerpoint/2010/main" val="3591071655"/>
       </p:ext>
     </p:extLst>
   </p:cSld>

</xml_diff>